<commit_message>
Update presentation and suggestion PPT files
</commit_message>
<xml_diff>
--- a/pengiun_game_suggestion.pptx
+++ b/pengiun_game_suggestion.pptx
@@ -4263,30 +4263,6 @@
           </a:prstGeom>
         </p:spPr>
       </p:pic>
-      <p:pic>
-        <p:nvPicPr>
-          <p:cNvPr id="91" name="Object 90"/>
-          <p:cNvPicPr>
-            <a:picLocks noChangeAspect="1"/>
-          </p:cNvPicPr>
-          <p:nvPr/>
-        </p:nvPicPr>
-        <p:blipFill>
-          <a:blip r:embed="rId31" cstate="print"/>
-          <a:stretch>
-            <a:fillRect/>
-          </a:stretch>
-        </p:blipFill>
-        <p:spPr>
-          <a:xfrm>
-            <a:off x="1790355" y="6126878"/>
-            <a:ext cx="2211677" cy="1184782"/>
-          </a:xfrm>
-          <a:prstGeom prst="rect">
-            <a:avLst/>
-          </a:prstGeom>
-        </p:spPr>
-      </p:pic>
     </p:spTree>
   </p:cSld>
   <p:clrMapOvr>

</xml_diff>